<commit_message>
v0.04.005 Fix: format.pptx (table font)
</commit_message>
<xml_diff>
--- a/static/format.pptx
+++ b/static/format.pptx
@@ -4570,10 +4570,10 @@
       </p:sp>
       <p:sp>
         <p:nvSpPr>
-          <p:cNvPr id="5" name="내용 개체 틀 4">
-            <a:extLst>
-              <a:ext uri="{FF2B5EF4-FFF2-40B4-BE49-F238E27FC236}">
-                <a16:creationId xmlns:a16="http://schemas.microsoft.com/office/drawing/2014/main" id="{A1AB63C2-4267-A17A-66F2-F24FAA85C8A2}"/>
+          <p:cNvPr id="11" name="내용 개체 틀 10">
+            <a:extLst>
+              <a:ext uri="{FF2B5EF4-FFF2-40B4-BE49-F238E27FC236}">
+                <a16:creationId xmlns:a16="http://schemas.microsoft.com/office/drawing/2014/main" id="{4C22A5B6-AF9E-6381-EF0D-669088876C64}"/>
               </a:ext>
             </a:extLst>
           </p:cNvPr>
@@ -4589,7 +4589,7 @@
           <a:bodyPr/>
           <a:lstStyle/>
           <a:p>
-            <a:endParaRPr lang="ko-KR" altLang="en-US" dirty="0"/>
+            <a:endParaRPr lang="ko-KR" altLang="en-US"/>
           </a:p>
         </p:txBody>
       </p:sp>
@@ -4647,76 +4647,16 @@
         <a:srgbClr val="800080"/>
       </a:folHlink>
     </a:clrScheme>
-    <a:fontScheme name="Office">
+    <a:fontScheme name="사용자 지정 2">
       <a:majorFont>
-        <a:latin typeface="Calibri"/>
-        <a:ea typeface=""/>
+        <a:latin typeface="Arial"/>
+        <a:ea typeface="맑은 고딕"/>
         <a:cs typeface=""/>
-        <a:font script="Jpan" typeface="ＭＳ Ｐゴシック"/>
-        <a:font script="Hang" typeface="맑은 고딕"/>
-        <a:font script="Hans" typeface="宋体"/>
-        <a:font script="Hant" typeface="新細明體"/>
-        <a:font script="Arab" typeface="Times New Roman"/>
-        <a:font script="Hebr" typeface="Times New Roman"/>
-        <a:font script="Thai" typeface="Angsana New"/>
-        <a:font script="Ethi" typeface="Nyala"/>
-        <a:font script="Beng" typeface="Vrinda"/>
-        <a:font script="Gujr" typeface="Shruti"/>
-        <a:font script="Khmr" typeface="MoolBoran"/>
-        <a:font script="Knda" typeface="Tunga"/>
-        <a:font script="Guru" typeface="Raavi"/>
-        <a:font script="Cans" typeface="Euphemia"/>
-        <a:font script="Cher" typeface="Plantagenet Cherokee"/>
-        <a:font script="Yiii" typeface="Microsoft Yi Baiti"/>
-        <a:font script="Tibt" typeface="Microsoft Himalaya"/>
-        <a:font script="Thaa" typeface="MV Boli"/>
-        <a:font script="Deva" typeface="Mangal"/>
-        <a:font script="Telu" typeface="Gautami"/>
-        <a:font script="Taml" typeface="Latha"/>
-        <a:font script="Syrc" typeface="Estrangelo Edessa"/>
-        <a:font script="Orya" typeface="Kalinga"/>
-        <a:font script="Mlym" typeface="Kartika"/>
-        <a:font script="Laoo" typeface="DokChampa"/>
-        <a:font script="Sinh" typeface="Iskoola Pota"/>
-        <a:font script="Mong" typeface="Mongolian Baiti"/>
-        <a:font script="Viet" typeface="Times New Roman"/>
-        <a:font script="Uigh" typeface="Microsoft Uighur"/>
-        <a:font script="Geor" typeface="Sylfaen"/>
       </a:majorFont>
       <a:minorFont>
-        <a:latin typeface="Calibri"/>
-        <a:ea typeface=""/>
+        <a:latin typeface="Arial"/>
+        <a:ea typeface="맑은 고딕"/>
         <a:cs typeface=""/>
-        <a:font script="Jpan" typeface="ＭＳ Ｐゴシック"/>
-        <a:font script="Hang" typeface="맑은 고딕"/>
-        <a:font script="Hans" typeface="宋体"/>
-        <a:font script="Hant" typeface="新細明體"/>
-        <a:font script="Arab" typeface="Arial"/>
-        <a:font script="Hebr" typeface="Arial"/>
-        <a:font script="Thai" typeface="Cordia New"/>
-        <a:font script="Ethi" typeface="Nyala"/>
-        <a:font script="Beng" typeface="Vrinda"/>
-        <a:font script="Gujr" typeface="Shruti"/>
-        <a:font script="Khmr" typeface="DaunPenh"/>
-        <a:font script="Knda" typeface="Tunga"/>
-        <a:font script="Guru" typeface="Raavi"/>
-        <a:font script="Cans" typeface="Euphemia"/>
-        <a:font script="Cher" typeface="Plantagenet Cherokee"/>
-        <a:font script="Yiii" typeface="Microsoft Yi Baiti"/>
-        <a:font script="Tibt" typeface="Microsoft Himalaya"/>
-        <a:font script="Thaa" typeface="MV Boli"/>
-        <a:font script="Deva" typeface="Mangal"/>
-        <a:font script="Telu" typeface="Gautami"/>
-        <a:font script="Taml" typeface="Latha"/>
-        <a:font script="Syrc" typeface="Estrangelo Edessa"/>
-        <a:font script="Orya" typeface="Kalinga"/>
-        <a:font script="Mlym" typeface="Kartika"/>
-        <a:font script="Laoo" typeface="DokChampa"/>
-        <a:font script="Sinh" typeface="Iskoola Pota"/>
-        <a:font script="Mong" typeface="Mongolian Baiti"/>
-        <a:font script="Viet" typeface="Arial"/>
-        <a:font script="Uigh" typeface="Microsoft Uighur"/>
-        <a:font script="Geor" typeface="Sylfaen"/>
       </a:minorFont>
     </a:fontScheme>
     <a:fmtScheme name="Office">

</xml_diff>

<commit_message>
v0.04.007 Fix: format.pptx (넘쳐도 자동 맞춤 안 함)
</commit_message>
<xml_diff>
--- a/static/format.pptx
+++ b/static/format.pptx
@@ -313,7 +313,7 @@
         </p:spPr>
         <p:txBody>
           <a:bodyPr>
-            <a:normAutofit/>
+            <a:noAutofit/>
           </a:bodyPr>
           <a:lstStyle>
             <a:lvl1pPr algn="l">
@@ -522,7 +522,9 @@
           </a:xfrm>
         </p:spPr>
         <p:txBody>
-          <a:bodyPr/>
+          <a:bodyPr>
+            <a:noAutofit/>
+          </a:bodyPr>
           <a:lstStyle>
             <a:lvl1pPr marL="230400" indent="-230400">
               <a:spcBef>
@@ -659,7 +661,7 @@
         </p:spPr>
         <p:txBody>
           <a:bodyPr>
-            <a:normAutofit/>
+            <a:noAutofit/>
           </a:bodyPr>
           <a:lstStyle>
             <a:lvl1pPr algn="l">
@@ -868,7 +870,9 @@
           </a:xfrm>
         </p:spPr>
         <p:txBody>
-          <a:bodyPr/>
+          <a:bodyPr>
+            <a:noAutofit/>
+          </a:bodyPr>
           <a:lstStyle>
             <a:lvl1pPr marL="230400" indent="-230400">
               <a:spcBef>
@@ -1005,7 +1009,7 @@
         </p:spPr>
         <p:txBody>
           <a:bodyPr>
-            <a:normAutofit/>
+            <a:noAutofit/>
           </a:bodyPr>
           <a:lstStyle>
             <a:lvl1pPr algn="l">
@@ -1048,7 +1052,7 @@
         </p:spPr>
         <p:txBody>
           <a:bodyPr>
-            <a:normAutofit/>
+            <a:noAutofit/>
           </a:bodyPr>
           <a:lstStyle>
             <a:lvl1pPr marL="230400" indent="-230400">
@@ -1654,7 +1658,7 @@
         </p:spPr>
         <p:txBody>
           <a:bodyPr>
-            <a:normAutofit/>
+            <a:noAutofit/>
           </a:bodyPr>
           <a:lstStyle>
             <a:lvl1pPr algn="l">
@@ -1864,7 +1868,7 @@
         </p:spPr>
         <p:txBody>
           <a:bodyPr>
-            <a:normAutofit/>
+            <a:noAutofit/>
           </a:bodyPr>
           <a:lstStyle>
             <a:lvl1pPr marL="230400" indent="-230400">
@@ -1982,7 +1986,7 @@
         </p:spPr>
         <p:txBody>
           <a:bodyPr>
-            <a:normAutofit/>
+            <a:noAutofit/>
           </a:bodyPr>
           <a:lstStyle>
             <a:lvl1pPr marL="230400" indent="-230400">
@@ -2475,7 +2479,7 @@
         </p:spPr>
         <p:txBody>
           <a:bodyPr>
-            <a:normAutofit/>
+            <a:noAutofit/>
           </a:bodyPr>
           <a:lstStyle>
             <a:lvl1pPr marL="230400" indent="-230400">
@@ -2593,7 +2597,7 @@
         </p:spPr>
         <p:txBody>
           <a:bodyPr>
-            <a:normAutofit/>
+            <a:noAutofit/>
           </a:bodyPr>
           <a:lstStyle>
             <a:lvl1pPr marL="230400" indent="-230400">
@@ -2714,7 +2718,7 @@
         </p:spPr>
         <p:txBody>
           <a:bodyPr>
-            <a:normAutofit/>
+            <a:noAutofit/>
           </a:bodyPr>
           <a:lstStyle>
             <a:lvl1pPr algn="l">
@@ -2790,7 +2794,7 @@
         </p:spPr>
         <p:txBody>
           <a:bodyPr>
-            <a:normAutofit/>
+            <a:noAutofit/>
           </a:bodyPr>
           <a:lstStyle>
             <a:lvl1pPr algn="l">
@@ -3188,7 +3192,7 @@
         </p:spPr>
         <p:txBody>
           <a:bodyPr>
-            <a:normAutofit/>
+            <a:noAutofit/>
           </a:bodyPr>
           <a:lstStyle>
             <a:lvl1pPr marL="230400" indent="-230400">
@@ -3309,7 +3313,7 @@
         </p:spPr>
         <p:txBody>
           <a:bodyPr>
-            <a:normAutofit/>
+            <a:noAutofit/>
           </a:bodyPr>
           <a:lstStyle>
             <a:lvl1pPr algn="l">
@@ -3756,7 +3760,9 @@
           </a:xfrm>
         </p:spPr>
         <p:txBody>
-          <a:bodyPr/>
+          <a:bodyPr>
+            <a:noAutofit/>
+          </a:bodyPr>
           <a:lstStyle/>
           <a:p>
             <a:endParaRPr lang="ko-KR" altLang="en-US"/>
@@ -3787,7 +3793,7 @@
         </p:spPr>
         <p:txBody>
           <a:bodyPr>
-            <a:normAutofit/>
+            <a:noAutofit/>
           </a:bodyPr>
           <a:lstStyle>
             <a:lvl1pPr marL="230400" indent="-230400">
@@ -3895,7 +3901,7 @@
         </p:spPr>
         <p:txBody>
           <a:bodyPr>
-            <a:normAutofit/>
+            <a:noAutofit/>
           </a:bodyPr>
           <a:lstStyle>
             <a:lvl1pPr algn="l">
@@ -4081,7 +4087,7 @@
             <a:fld id="{241EB5C9-1307-BA42-ABA2-0BC069CD8E7F}" type="datetimeFigureOut">
               <a:rPr lang="en-US" smtClean="0"/>
               <a:pPr/>
-              <a:t>8/13/2025</a:t>
+              <a:t>8/14/2025</a:t>
             </a:fld>
             <a:endParaRPr lang="en-US"/>
           </a:p>
@@ -4589,7 +4595,7 @@
           <a:bodyPr/>
           <a:lstStyle/>
           <a:p>
-            <a:endParaRPr lang="ko-KR" altLang="en-US"/>
+            <a:endParaRPr lang="ko-KR" altLang="en-US" dirty="0"/>
           </a:p>
         </p:txBody>
       </p:sp>

</xml_diff>